<commit_message>
Day 1 ASP.Net MVC
</commit_message>
<xml_diff>
--- a/ASP.NET_MVC_DAY1.pptx
+++ b/ASP.NET_MVC_DAY1.pptx
@@ -46,18 +46,6 @@
     <p:sldId id="316" r:id="rId40"/>
     <p:sldId id="317" r:id="rId41"/>
     <p:sldId id="318" r:id="rId42"/>
-    <p:sldId id="319" r:id="rId43"/>
-    <p:sldId id="320" r:id="rId44"/>
-    <p:sldId id="311" r:id="rId45"/>
-    <p:sldId id="312" r:id="rId46"/>
-    <p:sldId id="294" r:id="rId47"/>
-    <p:sldId id="295" r:id="rId48"/>
-    <p:sldId id="296" r:id="rId49"/>
-    <p:sldId id="297" r:id="rId50"/>
-    <p:sldId id="298" r:id="rId51"/>
-    <p:sldId id="276" r:id="rId52"/>
-    <p:sldId id="321" r:id="rId53"/>
-    <p:sldId id="322" r:id="rId54"/>
   </p:sldIdLst>
   <p:sldSz cx="9144000" cy="6858000" type="screen4x3"/>
   <p:notesSz cx="6858000" cy="9144000"/>
@@ -352,7 +340,7 @@
           <a:p>
             <a:fld id="{C70EA774-2A55-499C-ACF4-82C83EDD2B83}" type="datetimeFigureOut">
               <a:rPr lang="en-US" smtClean="0"/>
-              <a:t>9/5/2015</a:t>
+              <a:t>9/6/2015</a:t>
             </a:fld>
             <a:endParaRPr lang="en-US"/>
           </a:p>
@@ -617,7 +605,7 @@
           <a:p>
             <a:fld id="{C70EA774-2A55-499C-ACF4-82C83EDD2B83}" type="datetimeFigureOut">
               <a:rPr lang="en-US" smtClean="0"/>
-              <a:t>9/5/2015</a:t>
+              <a:t>9/6/2015</a:t>
             </a:fld>
             <a:endParaRPr lang="en-US"/>
           </a:p>
@@ -792,7 +780,7 @@
           <a:p>
             <a:fld id="{C70EA774-2A55-499C-ACF4-82C83EDD2B83}" type="datetimeFigureOut">
               <a:rPr lang="en-US" smtClean="0"/>
-              <a:t>9/5/2015</a:t>
+              <a:t>9/6/2015</a:t>
             </a:fld>
             <a:endParaRPr lang="en-US"/>
           </a:p>
@@ -957,7 +945,7 @@
           <a:p>
             <a:fld id="{C70EA774-2A55-499C-ACF4-82C83EDD2B83}" type="datetimeFigureOut">
               <a:rPr lang="en-US" smtClean="0"/>
-              <a:t>9/5/2015</a:t>
+              <a:t>9/6/2015</a:t>
             </a:fld>
             <a:endParaRPr lang="en-US"/>
           </a:p>
@@ -1206,7 +1194,7 @@
           <a:p>
             <a:fld id="{C70EA774-2A55-499C-ACF4-82C83EDD2B83}" type="datetimeFigureOut">
               <a:rPr lang="en-US" smtClean="0"/>
-              <a:t>9/5/2015</a:t>
+              <a:t>9/6/2015</a:t>
             </a:fld>
             <a:endParaRPr lang="en-US"/>
           </a:p>
@@ -1489,7 +1477,7 @@
           <a:p>
             <a:fld id="{C70EA774-2A55-499C-ACF4-82C83EDD2B83}" type="datetimeFigureOut">
               <a:rPr lang="en-US" smtClean="0"/>
-              <a:t>9/5/2015</a:t>
+              <a:t>9/6/2015</a:t>
             </a:fld>
             <a:endParaRPr lang="en-US"/>
           </a:p>
@@ -1928,7 +1916,7 @@
           <a:p>
             <a:fld id="{C70EA774-2A55-499C-ACF4-82C83EDD2B83}" type="datetimeFigureOut">
               <a:rPr lang="en-US" smtClean="0"/>
-              <a:t>9/5/2015</a:t>
+              <a:t>9/6/2015</a:t>
             </a:fld>
             <a:endParaRPr lang="en-US"/>
           </a:p>
@@ -2041,7 +2029,7 @@
           <a:p>
             <a:fld id="{C70EA774-2A55-499C-ACF4-82C83EDD2B83}" type="datetimeFigureOut">
               <a:rPr lang="en-US" smtClean="0"/>
-              <a:t>9/5/2015</a:t>
+              <a:t>9/6/2015</a:t>
             </a:fld>
             <a:endParaRPr lang="en-US"/>
           </a:p>
@@ -2131,7 +2119,7 @@
           <a:p>
             <a:fld id="{C70EA774-2A55-499C-ACF4-82C83EDD2B83}" type="datetimeFigureOut">
               <a:rPr lang="en-US" smtClean="0"/>
-              <a:t>9/5/2015</a:t>
+              <a:t>9/6/2015</a:t>
             </a:fld>
             <a:endParaRPr lang="en-US"/>
           </a:p>
@@ -2373,7 +2361,7 @@
           <a:p>
             <a:fld id="{C70EA774-2A55-499C-ACF4-82C83EDD2B83}" type="datetimeFigureOut">
               <a:rPr lang="en-US" smtClean="0"/>
-              <a:t>9/5/2015</a:t>
+              <a:t>9/6/2015</a:t>
             </a:fld>
             <a:endParaRPr lang="en-US"/>
           </a:p>
@@ -2667,7 +2655,7 @@
           <a:p>
             <a:fld id="{C70EA774-2A55-499C-ACF4-82C83EDD2B83}" type="datetimeFigureOut">
               <a:rPr lang="en-US" smtClean="0"/>
-              <a:t>9/5/2015</a:t>
+              <a:t>9/6/2015</a:t>
             </a:fld>
             <a:endParaRPr lang="en-US"/>
           </a:p>
@@ -2961,7 +2949,7 @@
           <a:p>
             <a:fld id="{C70EA774-2A55-499C-ACF4-82C83EDD2B83}" type="datetimeFigureOut">
               <a:rPr lang="en-US" smtClean="0"/>
-              <a:t>9/5/2015</a:t>
+              <a:t>9/6/2015</a:t>
             </a:fld>
             <a:endParaRPr lang="en-US"/>
           </a:p>
@@ -25213,6 +25201,13 @@
   <p:clrMapOvr>
     <a:masterClrMapping/>
   </p:clrMapOvr>
+  <p:timing>
+    <p:tnLst>
+      <p:par>
+        <p:cTn id="1" dur="indefinite" restart="never" nodeType="tmRoot"/>
+      </p:par>
+    </p:tnLst>
+  </p:timing>
 </p:sld>
 </file>
 
@@ -25245,7 +25240,9 @@
         </p:nvSpPr>
         <p:spPr/>
         <p:txBody>
-          <a:bodyPr/>
+          <a:bodyPr>
+            <a:normAutofit fontScale="90000"/>
+          </a:bodyPr>
           <a:lstStyle/>
           <a:p>
             <a:r>
@@ -25385,6 +25382,13 @@
   <p:clrMapOvr>
     <a:masterClrMapping/>
   </p:clrMapOvr>
+  <p:timing>
+    <p:tnLst>
+      <p:par>
+        <p:cTn id="1" dur="indefinite" restart="never" nodeType="tmRoot"/>
+      </p:par>
+    </p:tnLst>
+  </p:timing>
 </p:sld>
 </file>
 
@@ -25437,7 +25441,7 @@
         <p:spPr/>
         <p:txBody>
           <a:bodyPr>
-            <a:normAutofit fontScale="92500" lnSpcReduction="10000"/>
+            <a:normAutofit fontScale="92500" lnSpcReduction="20000"/>
           </a:bodyPr>
           <a:lstStyle/>
           <a:p>
@@ -25683,6 +25687,13 @@
   <p:clrMapOvr>
     <a:masterClrMapping/>
   </p:clrMapOvr>
+  <p:timing>
+    <p:tnLst>
+      <p:par>
+        <p:cTn id="1" dur="indefinite" restart="never" nodeType="tmRoot"/>
+      </p:par>
+    </p:tnLst>
+  </p:timing>
 </p:sld>
 </file>
 
@@ -25905,6 +25916,13 @@
   <p:clrMapOvr>
     <a:masterClrMapping/>
   </p:clrMapOvr>
+  <p:timing>
+    <p:tnLst>
+      <p:par>
+        <p:cTn id="1" dur="indefinite" restart="never" nodeType="tmRoot"/>
+      </p:par>
+    </p:tnLst>
+  </p:timing>
 </p:sld>
 </file>
 
@@ -25943,7 +25961,7 @@
         </p:spPr>
         <p:txBody>
           <a:bodyPr>
-            <a:normAutofit fontScale="85000" lnSpcReduction="20000"/>
+            <a:normAutofit fontScale="85000" lnSpcReduction="10000"/>
           </a:bodyPr>
           <a:lstStyle/>
           <a:p>
@@ -26276,6 +26294,13 @@
   <p:clrMapOvr>
     <a:masterClrMapping/>
   </p:clrMapOvr>
+  <p:timing>
+    <p:tnLst>
+      <p:par>
+        <p:cTn id="1" dur="indefinite" restart="never" nodeType="tmRoot"/>
+      </p:par>
+    </p:tnLst>
+  </p:timing>
 </p:sld>
 </file>
 
@@ -26644,7 +26669,7 @@
         <p:spPr/>
         <p:txBody>
           <a:bodyPr>
-            <a:normAutofit lnSpcReduction="10000"/>
+            <a:normAutofit fontScale="92500" lnSpcReduction="20000"/>
           </a:bodyPr>
           <a:lstStyle/>
           <a:p>
@@ -26728,6 +26753,13 @@
   <p:clrMapOvr>
     <a:masterClrMapping/>
   </p:clrMapOvr>
+  <p:timing>
+    <p:tnLst>
+      <p:par>
+        <p:cTn id="1" dur="indefinite" restart="never" nodeType="tmRoot"/>
+      </p:par>
+    </p:tnLst>
+  </p:timing>
 </p:sld>
 </file>
 
@@ -26780,7 +26812,7 @@
         <p:spPr/>
         <p:txBody>
           <a:bodyPr>
-            <a:normAutofit lnSpcReduction="10000"/>
+            <a:normAutofit fontScale="92500" lnSpcReduction="10000"/>
           </a:bodyPr>
           <a:lstStyle/>
           <a:p>
@@ -26830,1332 +26862,6 @@
     <p:extLst>
       <p:ext uri="{BB962C8B-B14F-4D97-AF65-F5344CB8AC3E}">
         <p14:creationId xmlns:p14="http://schemas.microsoft.com/office/powerpoint/2010/main" val="2386902309"/>
-      </p:ext>
-    </p:extLst>
-  </p:cSld>
-  <p:clrMapOvr>
-    <a:masterClrMapping/>
-  </p:clrMapOvr>
-</p:sld>
-</file>
-
-<file path=ppt/slides/slide42.xml><?xml version="1.0" encoding="utf-8"?>
-<p:sld xmlns:a="http://schemas.openxmlformats.org/drawingml/2006/main" xmlns:r="http://schemas.openxmlformats.org/officeDocument/2006/relationships" xmlns:p="http://schemas.openxmlformats.org/presentationml/2006/main">
-  <p:cSld>
-    <p:spTree>
-      <p:nvGrpSpPr>
-        <p:cNvPr id="1" name=""/>
-        <p:cNvGrpSpPr/>
-        <p:nvPr/>
-      </p:nvGrpSpPr>
-      <p:grpSpPr>
-        <a:xfrm>
-          <a:off x="0" y="0"/>
-          <a:ext cx="0" cy="0"/>
-          <a:chOff x="0" y="0"/>
-          <a:chExt cx="0" cy="0"/>
-        </a:xfrm>
-      </p:grpSpPr>
-      <p:sp>
-        <p:nvSpPr>
-          <p:cNvPr id="2" name="Title 1"/>
-          <p:cNvSpPr>
-            <a:spLocks noGrp="1"/>
-          </p:cNvSpPr>
-          <p:nvPr>
-            <p:ph type="title"/>
-          </p:nvPr>
-        </p:nvSpPr>
-        <p:spPr/>
-        <p:txBody>
-          <a:bodyPr/>
-          <a:lstStyle/>
-          <a:p>
-            <a:r>
-              <a:rPr lang="en-US" dirty="0" smtClean="0"/>
-              <a:t>Custom View Engine</a:t>
-            </a:r>
-            <a:endParaRPr lang="en-US" dirty="0"/>
-          </a:p>
-        </p:txBody>
-      </p:sp>
-      <p:sp>
-        <p:nvSpPr>
-          <p:cNvPr id="3" name="Content Placeholder 2"/>
-          <p:cNvSpPr>
-            <a:spLocks noGrp="1"/>
-          </p:cNvSpPr>
-          <p:nvPr>
-            <p:ph idx="1"/>
-          </p:nvPr>
-        </p:nvSpPr>
-        <p:spPr/>
-        <p:txBody>
-          <a:bodyPr/>
-          <a:lstStyle/>
-          <a:p>
-            <a:r>
-              <a:rPr lang="en-US" dirty="0"/>
-              <a:t>In addition to the </a:t>
-            </a:r>
-            <a:r>
-              <a:rPr lang="en-US" dirty="0" smtClean="0"/>
-              <a:t>2 </a:t>
-            </a:r>
-            <a:r>
-              <a:rPr lang="en-US" dirty="0"/>
-              <a:t>view </a:t>
-            </a:r>
-            <a:r>
-              <a:rPr lang="en-US" dirty="0" smtClean="0"/>
-              <a:t>engines(ASPX &amp; RAZOR), </a:t>
-            </a:r>
-            <a:r>
-              <a:rPr lang="en-US" dirty="0"/>
-              <a:t>there are several </a:t>
-            </a:r>
-            <a:r>
-              <a:rPr lang="en-US" b="1" dirty="0"/>
-              <a:t>custom view engines</a:t>
-            </a:r>
-            <a:r>
-              <a:rPr lang="en-US" dirty="0"/>
-              <a:t> that can be used with asp.net </a:t>
-            </a:r>
-            <a:r>
-              <a:rPr lang="en-US" dirty="0" err="1"/>
-              <a:t>mvc</a:t>
-            </a:r>
-            <a:r>
-              <a:rPr lang="en-US" dirty="0"/>
-              <a:t>. The following are a few of these custom view engines.</a:t>
-            </a:r>
-            <a:br>
-              <a:rPr lang="en-US" dirty="0"/>
-            </a:br>
-            <a:r>
-              <a:rPr lang="en-US" b="1" dirty="0"/>
-              <a:t>1.</a:t>
-            </a:r>
-            <a:r>
-              <a:rPr lang="en-US" dirty="0"/>
-              <a:t> Spark</a:t>
-            </a:r>
-            <a:br>
-              <a:rPr lang="en-US" dirty="0"/>
-            </a:br>
-            <a:r>
-              <a:rPr lang="en-US" b="1" dirty="0"/>
-              <a:t>2.</a:t>
-            </a:r>
-            <a:r>
-              <a:rPr lang="en-US" dirty="0"/>
-              <a:t> </a:t>
-            </a:r>
-            <a:r>
-              <a:rPr lang="en-US" dirty="0" err="1"/>
-              <a:t>NHaml</a:t>
-            </a:r>
-            <a:r>
-              <a:rPr lang="en-US" dirty="0"/>
-              <a:t/>
-            </a:r>
-            <a:br>
-              <a:rPr lang="en-US" dirty="0"/>
-            </a:br>
-            <a:r>
-              <a:rPr lang="en-US" b="1" dirty="0"/>
-              <a:t>3.</a:t>
-            </a:r>
-            <a:r>
-              <a:rPr lang="en-US" dirty="0"/>
-              <a:t> </a:t>
-            </a:r>
-            <a:r>
-              <a:rPr lang="en-US" dirty="0" err="1"/>
-              <a:t>SharpDOM</a:t>
-            </a:r>
-            <a:r>
-              <a:rPr lang="en-US" dirty="0"/>
-              <a:t/>
-            </a:r>
-            <a:br>
-              <a:rPr lang="en-US" dirty="0"/>
-            </a:br>
-            <a:r>
-              <a:rPr lang="en-US" b="1" dirty="0"/>
-              <a:t>4.</a:t>
-            </a:r>
-            <a:r>
-              <a:rPr lang="en-US" dirty="0"/>
-              <a:t> Brail etc</a:t>
-            </a:r>
-            <a:r>
-              <a:rPr lang="en-US" dirty="0" smtClean="0"/>
-              <a:t>....</a:t>
-            </a:r>
-          </a:p>
-          <a:p>
-            <a:endParaRPr lang="en-US" dirty="0"/>
-          </a:p>
-          <a:p>
-            <a:r>
-              <a:rPr lang="en-US" dirty="0"/>
-              <a:t>I</a:t>
-            </a:r>
-            <a:r>
-              <a:rPr lang="en-US" dirty="0" smtClean="0"/>
-              <a:t>f </a:t>
-            </a:r>
-            <a:r>
-              <a:rPr lang="en-US" dirty="0"/>
-              <a:t>you want to use Spark as the view engine for your asp.net </a:t>
-            </a:r>
-            <a:r>
-              <a:rPr lang="en-US" dirty="0" err="1"/>
-              <a:t>mvc</a:t>
-            </a:r>
-            <a:r>
-              <a:rPr lang="en-US" dirty="0"/>
-              <a:t> 4 project, then install </a:t>
-            </a:r>
-            <a:r>
-              <a:rPr lang="en-US" b="1" dirty="0"/>
-              <a:t>Spark.Web.Mvc4</a:t>
-            </a:r>
-            <a:r>
-              <a:rPr lang="en-US" dirty="0"/>
-              <a:t> using </a:t>
-            </a:r>
-            <a:r>
-              <a:rPr lang="en-US" b="1" dirty="0" err="1"/>
-              <a:t>NuGet</a:t>
-            </a:r>
-            <a:r>
-              <a:rPr lang="en-US" b="1" dirty="0"/>
-              <a:t> Package Manager</a:t>
-            </a:r>
-            <a:r>
-              <a:rPr lang="en-US" dirty="0"/>
-              <a:t>. </a:t>
-            </a:r>
-          </a:p>
-        </p:txBody>
-      </p:sp>
-    </p:spTree>
-    <p:extLst>
-      <p:ext uri="{BB962C8B-B14F-4D97-AF65-F5344CB8AC3E}">
-        <p14:creationId xmlns:p14="http://schemas.microsoft.com/office/powerpoint/2010/main" val="1978212082"/>
-      </p:ext>
-    </p:extLst>
-  </p:cSld>
-  <p:clrMapOvr>
-    <a:masterClrMapping/>
-  </p:clrMapOvr>
-  <p:timing>
-    <p:tnLst>
-      <p:par>
-        <p:cTn id="1" dur="indefinite" restart="never" nodeType="tmRoot"/>
-      </p:par>
-    </p:tnLst>
-  </p:timing>
-</p:sld>
-</file>
-
-<file path=ppt/slides/slide43.xml><?xml version="1.0" encoding="utf-8"?>
-<p:sld xmlns:a="http://schemas.openxmlformats.org/drawingml/2006/main" xmlns:r="http://schemas.openxmlformats.org/officeDocument/2006/relationships" xmlns:p="http://schemas.openxmlformats.org/presentationml/2006/main">
-  <p:cSld>
-    <p:spTree>
-      <p:nvGrpSpPr>
-        <p:cNvPr id="1" name=""/>
-        <p:cNvGrpSpPr/>
-        <p:nvPr/>
-      </p:nvGrpSpPr>
-      <p:grpSpPr>
-        <a:xfrm>
-          <a:off x="0" y="0"/>
-          <a:ext cx="0" cy="0"/>
-          <a:chOff x="0" y="0"/>
-          <a:chExt cx="0" cy="0"/>
-        </a:xfrm>
-      </p:grpSpPr>
-      <p:sp>
-        <p:nvSpPr>
-          <p:cNvPr id="2" name="Title 1"/>
-          <p:cNvSpPr>
-            <a:spLocks noGrp="1"/>
-          </p:cNvSpPr>
-          <p:nvPr>
-            <p:ph type="title"/>
-          </p:nvPr>
-        </p:nvSpPr>
-        <p:spPr/>
-        <p:txBody>
-          <a:bodyPr/>
-          <a:lstStyle/>
-          <a:p>
-            <a:r>
-              <a:rPr lang="en-US" dirty="0" smtClean="0"/>
-              <a:t>Add Spark View Engine</a:t>
-            </a:r>
-            <a:endParaRPr lang="en-US" dirty="0"/>
-          </a:p>
-        </p:txBody>
-      </p:sp>
-      <p:sp>
-        <p:nvSpPr>
-          <p:cNvPr id="3" name="Content Placeholder 2"/>
-          <p:cNvSpPr>
-            <a:spLocks noGrp="1"/>
-          </p:cNvSpPr>
-          <p:nvPr>
-            <p:ph idx="1"/>
-          </p:nvPr>
-        </p:nvSpPr>
-        <p:spPr/>
-        <p:txBody>
-          <a:bodyPr>
-            <a:normAutofit fontScale="92500" lnSpcReduction="10000"/>
-          </a:bodyPr>
-          <a:lstStyle/>
-          <a:p>
-            <a:r>
-              <a:rPr lang="en-US" b="1" dirty="0"/>
-              <a:t>Step 1:</a:t>
-            </a:r>
-            <a:r>
-              <a:rPr lang="en-US" dirty="0"/>
-              <a:t> Navigate to the following path and create a folder with name=</a:t>
-            </a:r>
-            <a:r>
-              <a:rPr lang="en-US" b="1" dirty="0"/>
-              <a:t>"Spark"</a:t>
-            </a:r>
-            <a:r>
-              <a:rPr lang="en-US" dirty="0"/>
-              <a:t>. Spark specific templates must be copied into "Spark" folder.</a:t>
-            </a:r>
-            <a:br>
-              <a:rPr lang="en-US" dirty="0"/>
-            </a:br>
-            <a:r>
-              <a:rPr lang="en-US" b="1" dirty="0"/>
-              <a:t>C:\Program Files (x86)\Microsoft Visual Studio 10.0\Common7\IDE\</a:t>
-            </a:r>
-            <a:r>
-              <a:rPr lang="en-US" b="1" dirty="0" err="1"/>
-              <a:t>ItemTemplates</a:t>
-            </a:r>
-            <a:r>
-              <a:rPr lang="en-US" b="1" dirty="0"/>
-              <a:t>\</a:t>
-            </a:r>
-            <a:r>
-              <a:rPr lang="en-US" b="1" dirty="0" err="1"/>
-              <a:t>CSharp</a:t>
-            </a:r>
-            <a:r>
-              <a:rPr lang="en-US" b="1" dirty="0"/>
-              <a:t>\Web\MVC </a:t>
-            </a:r>
-            <a:r>
-              <a:rPr lang="en-US" b="1" dirty="0" smtClean="0"/>
-              <a:t>4\</a:t>
-            </a:r>
-            <a:r>
-              <a:rPr lang="en-US" b="1" dirty="0" err="1" smtClean="0"/>
-              <a:t>CodeTemplates</a:t>
-            </a:r>
-            <a:r>
-              <a:rPr lang="en-US" b="1" dirty="0" smtClean="0"/>
-              <a:t>\</a:t>
-            </a:r>
-            <a:r>
-              <a:rPr lang="en-US" b="1" dirty="0" err="1" smtClean="0"/>
-              <a:t>AddView</a:t>
-            </a:r>
-            <a:endParaRPr lang="en-US" b="1" dirty="0" smtClean="0"/>
-          </a:p>
-          <a:p>
-            <a:endParaRPr lang="en-US" b="1" dirty="0" smtClean="0"/>
-          </a:p>
-          <a:p>
-            <a:r>
-              <a:rPr lang="en-US" b="1" dirty="0"/>
-              <a:t>Step 2:</a:t>
-            </a:r>
-            <a:r>
-              <a:rPr lang="en-US" dirty="0"/>
-              <a:t> Create an xml file with in </a:t>
-            </a:r>
-            <a:r>
-              <a:rPr lang="en-US" b="1" dirty="0"/>
-              <a:t>"Spark" </a:t>
-            </a:r>
-            <a:r>
-              <a:rPr lang="en-US" dirty="0"/>
-              <a:t>folder. The name of the XML file must </a:t>
-            </a:r>
-            <a:r>
-              <a:rPr lang="en-US" dirty="0" err="1"/>
-              <a:t>be</a:t>
-            </a:r>
-            <a:r>
-              <a:rPr lang="en-US" b="1" dirty="0" err="1"/>
-              <a:t>"ViewEngine.xml</a:t>
-            </a:r>
-            <a:r>
-              <a:rPr lang="en-US" b="1" dirty="0"/>
-              <a:t>"</a:t>
-            </a:r>
-            <a:r>
-              <a:rPr lang="en-US" dirty="0"/>
-              <a:t> and must contain the following xml content.</a:t>
-            </a:r>
-            <a:br>
-              <a:rPr lang="en-US" dirty="0"/>
-            </a:br>
-            <a:r>
-              <a:rPr lang="en-US" dirty="0"/>
-              <a:t>&lt;?xml version="1.0" encoding="utf-8" ?&gt;</a:t>
-            </a:r>
-            <a:br>
-              <a:rPr lang="en-US" dirty="0"/>
-            </a:br>
-            <a:r>
-              <a:rPr lang="en-US" dirty="0"/>
-              <a:t>&lt;</a:t>
-            </a:r>
-            <a:r>
-              <a:rPr lang="en-US" dirty="0" err="1"/>
-              <a:t>ViewEngine</a:t>
-            </a:r>
-            <a:r>
-              <a:rPr lang="en-US" dirty="0"/>
-              <a:t> </a:t>
-            </a:r>
-            <a:r>
-              <a:rPr lang="en-US" dirty="0" err="1"/>
-              <a:t>DisplayName</a:t>
-            </a:r>
-            <a:r>
-              <a:rPr lang="en-US" dirty="0"/>
-              <a:t>="Spark" </a:t>
-            </a:r>
-            <a:br>
-              <a:rPr lang="en-US" dirty="0"/>
-            </a:br>
-            <a:r>
-              <a:rPr lang="en-US" dirty="0"/>
-              <a:t>  </a:t>
-            </a:r>
-            <a:r>
-              <a:rPr lang="en-US" dirty="0" err="1"/>
-              <a:t>ViewFileExtension</a:t>
-            </a:r>
-            <a:r>
-              <a:rPr lang="en-US" dirty="0"/>
-              <a:t>=".spark" </a:t>
-            </a:r>
-            <a:br>
-              <a:rPr lang="en-US" dirty="0"/>
-            </a:br>
-            <a:r>
-              <a:rPr lang="en-US" dirty="0"/>
-              <a:t>  </a:t>
-            </a:r>
-            <a:r>
-              <a:rPr lang="en-US" dirty="0" err="1"/>
-              <a:t>DefaultLayoutPage</a:t>
-            </a:r>
-            <a:r>
-              <a:rPr lang="en-US" dirty="0"/>
-              <a:t>="~/Views/Shared/_</a:t>
-            </a:r>
-            <a:r>
-              <a:rPr lang="en-US" dirty="0" err="1"/>
-              <a:t>Layout.spark</a:t>
-            </a:r>
-            <a:r>
-              <a:rPr lang="en-US" dirty="0"/>
-              <a:t>" </a:t>
-            </a:r>
-            <a:br>
-              <a:rPr lang="en-US" dirty="0"/>
-            </a:br>
-            <a:r>
-              <a:rPr lang="en-US" dirty="0"/>
-              <a:t>  </a:t>
-            </a:r>
-            <a:r>
-              <a:rPr lang="en-US" dirty="0" err="1"/>
-              <a:t>PartialViewFileExtension</a:t>
-            </a:r>
-            <a:r>
-              <a:rPr lang="en-US" dirty="0"/>
-              <a:t>=".spark" /&gt;</a:t>
-            </a:r>
-          </a:p>
-        </p:txBody>
-      </p:sp>
-    </p:spTree>
-    <p:extLst>
-      <p:ext uri="{BB962C8B-B14F-4D97-AF65-F5344CB8AC3E}">
-        <p14:creationId xmlns:p14="http://schemas.microsoft.com/office/powerpoint/2010/main" val="2175105301"/>
-      </p:ext>
-    </p:extLst>
-  </p:cSld>
-  <p:clrMapOvr>
-    <a:masterClrMapping/>
-  </p:clrMapOvr>
-</p:sld>
-</file>
-
-<file path=ppt/slides/slide44.xml><?xml version="1.0" encoding="utf-8"?>
-<p:sld xmlns:a="http://schemas.openxmlformats.org/drawingml/2006/main" xmlns:r="http://schemas.openxmlformats.org/officeDocument/2006/relationships" xmlns:p="http://schemas.openxmlformats.org/presentationml/2006/main">
-  <p:cSld>
-    <p:spTree>
-      <p:nvGrpSpPr>
-        <p:cNvPr id="1" name=""/>
-        <p:cNvGrpSpPr/>
-        <p:nvPr/>
-      </p:nvGrpSpPr>
-      <p:grpSpPr>
-        <a:xfrm>
-          <a:off x="0" y="0"/>
-          <a:ext cx="0" cy="0"/>
-          <a:chOff x="0" y="0"/>
-          <a:chExt cx="0" cy="0"/>
-        </a:xfrm>
-      </p:grpSpPr>
-      <p:sp>
-        <p:nvSpPr>
-          <p:cNvPr id="2" name="Title 1"/>
-          <p:cNvSpPr>
-            <a:spLocks noGrp="1"/>
-          </p:cNvSpPr>
-          <p:nvPr>
-            <p:ph type="title"/>
-          </p:nvPr>
-        </p:nvSpPr>
-        <p:spPr/>
-        <p:txBody>
-          <a:bodyPr/>
-          <a:lstStyle/>
-          <a:p>
-            <a:r>
-              <a:rPr lang="en-US" dirty="0" err="1" smtClean="0"/>
-              <a:t>ViewBag</a:t>
-            </a:r>
-            <a:r>
-              <a:rPr lang="en-US" dirty="0" smtClean="0"/>
-              <a:t> vs </a:t>
-            </a:r>
-            <a:r>
-              <a:rPr lang="en-US" dirty="0" err="1" smtClean="0"/>
-              <a:t>ViewData</a:t>
-            </a:r>
-            <a:endParaRPr lang="en-US" dirty="0"/>
-          </a:p>
-        </p:txBody>
-      </p:sp>
-      <p:pic>
-        <p:nvPicPr>
-          <p:cNvPr id="6147" name="Picture 3" descr="C:\Users\ah0181212\Desktop\Images\4-5-2015 8-22-59 PM.png"/>
-          <p:cNvPicPr>
-            <a:picLocks noChangeAspect="1" noChangeArrowheads="1"/>
-          </p:cNvPicPr>
-          <p:nvPr/>
-        </p:nvPicPr>
-        <p:blipFill>
-          <a:blip r:embed="rId2">
-            <a:extLst>
-              <a:ext uri="{28A0092B-C50C-407E-A947-70E740481C1C}">
-                <a14:useLocalDpi xmlns:a14="http://schemas.microsoft.com/office/drawing/2010/main" val="0"/>
-              </a:ext>
-            </a:extLst>
-          </a:blip>
-          <a:srcRect/>
-          <a:stretch>
-            <a:fillRect/>
-          </a:stretch>
-        </p:blipFill>
-        <p:spPr bwMode="auto">
-          <a:xfrm>
-            <a:off x="533400" y="1600200"/>
-            <a:ext cx="7467600" cy="4953000"/>
-          </a:xfrm>
-          <a:prstGeom prst="rect">
-            <a:avLst/>
-          </a:prstGeom>
-          <a:noFill/>
-          <a:extLst>
-            <a:ext uri="{909E8E84-426E-40DD-AFC4-6F175D3DCCD1}">
-              <a14:hiddenFill xmlns:a14="http://schemas.microsoft.com/office/drawing/2010/main">
-                <a:solidFill>
-                  <a:srgbClr val="FFFFFF"/>
-                </a:solidFill>
-              </a14:hiddenFill>
-            </a:ext>
-          </a:extLst>
-        </p:spPr>
-      </p:pic>
-    </p:spTree>
-    <p:extLst>
-      <p:ext uri="{BB962C8B-B14F-4D97-AF65-F5344CB8AC3E}">
-        <p14:creationId xmlns:p14="http://schemas.microsoft.com/office/powerpoint/2010/main" val="2549810269"/>
-      </p:ext>
-    </p:extLst>
-  </p:cSld>
-  <p:clrMapOvr>
-    <a:masterClrMapping/>
-  </p:clrMapOvr>
-  <p:timing>
-    <p:tnLst>
-      <p:par>
-        <p:cTn id="1" dur="indefinite" restart="never" nodeType="tmRoot"/>
-      </p:par>
-    </p:tnLst>
-  </p:timing>
-</p:sld>
-</file>
-
-<file path=ppt/slides/slide45.xml><?xml version="1.0" encoding="utf-8"?>
-<p:sld xmlns:a="http://schemas.openxmlformats.org/drawingml/2006/main" xmlns:r="http://schemas.openxmlformats.org/officeDocument/2006/relationships" xmlns:p="http://schemas.openxmlformats.org/presentationml/2006/main">
-  <p:cSld>
-    <p:spTree>
-      <p:nvGrpSpPr>
-        <p:cNvPr id="1" name=""/>
-        <p:cNvGrpSpPr/>
-        <p:nvPr/>
-      </p:nvGrpSpPr>
-      <p:grpSpPr>
-        <a:xfrm>
-          <a:off x="0" y="0"/>
-          <a:ext cx="0" cy="0"/>
-          <a:chOff x="0" y="0"/>
-          <a:chExt cx="0" cy="0"/>
-        </a:xfrm>
-      </p:grpSpPr>
-      <p:sp>
-        <p:nvSpPr>
-          <p:cNvPr id="2" name="Title 1"/>
-          <p:cNvSpPr>
-            <a:spLocks noGrp="1"/>
-          </p:cNvSpPr>
-          <p:nvPr>
-            <p:ph type="title"/>
-          </p:nvPr>
-        </p:nvSpPr>
-        <p:spPr/>
-        <p:txBody>
-          <a:bodyPr/>
-          <a:lstStyle/>
-          <a:p>
-            <a:r>
-              <a:rPr lang="en-US" dirty="0" smtClean="0"/>
-              <a:t>Data Manage</a:t>
-            </a:r>
-            <a:endParaRPr lang="en-US" dirty="0"/>
-          </a:p>
-        </p:txBody>
-      </p:sp>
-      <p:pic>
-        <p:nvPicPr>
-          <p:cNvPr id="7170" name="Picture 2" descr="http://www.codeproject.com/KB/aspnet/556995/3.jpg"/>
-          <p:cNvPicPr>
-            <a:picLocks noChangeAspect="1" noChangeArrowheads="1"/>
-          </p:cNvPicPr>
-          <p:nvPr/>
-        </p:nvPicPr>
-        <p:blipFill>
-          <a:blip r:embed="rId2">
-            <a:extLst>
-              <a:ext uri="{28A0092B-C50C-407E-A947-70E740481C1C}">
-                <a14:useLocalDpi xmlns:a14="http://schemas.microsoft.com/office/drawing/2010/main" val="0"/>
-              </a:ext>
-            </a:extLst>
-          </a:blip>
-          <a:srcRect/>
-          <a:stretch>
-            <a:fillRect/>
-          </a:stretch>
-        </p:blipFill>
-        <p:spPr bwMode="auto">
-          <a:xfrm>
-            <a:off x="762000" y="1828800"/>
-            <a:ext cx="6553200" cy="4892862"/>
-          </a:xfrm>
-          <a:prstGeom prst="rect">
-            <a:avLst/>
-          </a:prstGeom>
-          <a:noFill/>
-          <a:extLst>
-            <a:ext uri="{909E8E84-426E-40DD-AFC4-6F175D3DCCD1}">
-              <a14:hiddenFill xmlns:a14="http://schemas.microsoft.com/office/drawing/2010/main">
-                <a:solidFill>
-                  <a:srgbClr val="FFFFFF"/>
-                </a:solidFill>
-              </a14:hiddenFill>
-            </a:ext>
-          </a:extLst>
-        </p:spPr>
-      </p:pic>
-    </p:spTree>
-    <p:extLst>
-      <p:ext uri="{BB962C8B-B14F-4D97-AF65-F5344CB8AC3E}">
-        <p14:creationId xmlns:p14="http://schemas.microsoft.com/office/powerpoint/2010/main" val="2242701958"/>
-      </p:ext>
-    </p:extLst>
-  </p:cSld>
-  <p:clrMapOvr>
-    <a:masterClrMapping/>
-  </p:clrMapOvr>
-  <p:timing>
-    <p:tnLst>
-      <p:par>
-        <p:cTn id="1" dur="indefinite" restart="never" nodeType="tmRoot"/>
-      </p:par>
-    </p:tnLst>
-  </p:timing>
-</p:sld>
-</file>
-
-<file path=ppt/slides/slide46.xml><?xml version="1.0" encoding="utf-8"?>
-<p:sld xmlns:a="http://schemas.openxmlformats.org/drawingml/2006/main" xmlns:r="http://schemas.openxmlformats.org/officeDocument/2006/relationships" xmlns:p="http://schemas.openxmlformats.org/presentationml/2006/main">
-  <p:cSld>
-    <p:spTree>
-      <p:nvGrpSpPr>
-        <p:cNvPr id="1" name=""/>
-        <p:cNvGrpSpPr/>
-        <p:nvPr/>
-      </p:nvGrpSpPr>
-      <p:grpSpPr>
-        <a:xfrm>
-          <a:off x="0" y="0"/>
-          <a:ext cx="0" cy="0"/>
-          <a:chOff x="0" y="0"/>
-          <a:chExt cx="0" cy="0"/>
-        </a:xfrm>
-      </p:grpSpPr>
-      <p:sp>
-        <p:nvSpPr>
-          <p:cNvPr id="2" name="Title 1"/>
-          <p:cNvSpPr>
-            <a:spLocks noGrp="1"/>
-          </p:cNvSpPr>
-          <p:nvPr>
-            <p:ph type="title"/>
-          </p:nvPr>
-        </p:nvSpPr>
-        <p:spPr/>
-        <p:txBody>
-          <a:bodyPr/>
-          <a:lstStyle/>
-          <a:p>
-            <a:r>
-              <a:rPr lang="en-US" dirty="0" smtClean="0"/>
-              <a:t>Model in MVC Application</a:t>
-            </a:r>
-            <a:endParaRPr lang="en-US" dirty="0"/>
-          </a:p>
-        </p:txBody>
-      </p:sp>
-      <p:pic>
-        <p:nvPicPr>
-          <p:cNvPr id="8195" name="Picture 3" descr="C:\Users\ah0181212\Desktop\Images\4-5-2015 8-47-27 PM.png"/>
-          <p:cNvPicPr>
-            <a:picLocks noChangeAspect="1" noChangeArrowheads="1"/>
-          </p:cNvPicPr>
-          <p:nvPr/>
-        </p:nvPicPr>
-        <p:blipFill>
-          <a:blip r:embed="rId2">
-            <a:extLst>
-              <a:ext uri="{28A0092B-C50C-407E-A947-70E740481C1C}">
-                <a14:useLocalDpi xmlns:a14="http://schemas.microsoft.com/office/drawing/2010/main" val="0"/>
-              </a:ext>
-            </a:extLst>
-          </a:blip>
-          <a:srcRect/>
-          <a:stretch>
-            <a:fillRect/>
-          </a:stretch>
-        </p:blipFill>
-        <p:spPr bwMode="auto">
-          <a:xfrm>
-            <a:off x="304800" y="1524000"/>
-            <a:ext cx="7893302" cy="5105400"/>
-          </a:xfrm>
-          <a:prstGeom prst="rect">
-            <a:avLst/>
-          </a:prstGeom>
-          <a:noFill/>
-          <a:extLst>
-            <a:ext uri="{909E8E84-426E-40DD-AFC4-6F175D3DCCD1}">
-              <a14:hiddenFill xmlns:a14="http://schemas.microsoft.com/office/drawing/2010/main">
-                <a:solidFill>
-                  <a:srgbClr val="FFFFFF"/>
-                </a:solidFill>
-              </a14:hiddenFill>
-            </a:ext>
-          </a:extLst>
-        </p:spPr>
-      </p:pic>
-    </p:spTree>
-    <p:extLst>
-      <p:ext uri="{BB962C8B-B14F-4D97-AF65-F5344CB8AC3E}">
-        <p14:creationId xmlns:p14="http://schemas.microsoft.com/office/powerpoint/2010/main" val="1167990307"/>
-      </p:ext>
-    </p:extLst>
-  </p:cSld>
-  <p:clrMapOvr>
-    <a:masterClrMapping/>
-  </p:clrMapOvr>
-  <p:timing>
-    <p:tnLst>
-      <p:par>
-        <p:cTn id="1" dur="indefinite" restart="never" nodeType="tmRoot"/>
-      </p:par>
-    </p:tnLst>
-  </p:timing>
-</p:sld>
-</file>
-
-<file path=ppt/slides/slide47.xml><?xml version="1.0" encoding="utf-8"?>
-<p:sld xmlns:a="http://schemas.openxmlformats.org/drawingml/2006/main" xmlns:r="http://schemas.openxmlformats.org/officeDocument/2006/relationships" xmlns:p="http://schemas.openxmlformats.org/presentationml/2006/main">
-  <p:cSld>
-    <p:spTree>
-      <p:nvGrpSpPr>
-        <p:cNvPr id="1" name=""/>
-        <p:cNvGrpSpPr/>
-        <p:nvPr/>
-      </p:nvGrpSpPr>
-      <p:grpSpPr>
-        <a:xfrm>
-          <a:off x="0" y="0"/>
-          <a:ext cx="0" cy="0"/>
-          <a:chOff x="0" y="0"/>
-          <a:chExt cx="0" cy="0"/>
-        </a:xfrm>
-      </p:grpSpPr>
-      <p:sp>
-        <p:nvSpPr>
-          <p:cNvPr id="2" name="Title 1"/>
-          <p:cNvSpPr>
-            <a:spLocks noGrp="1"/>
-          </p:cNvSpPr>
-          <p:nvPr>
-            <p:ph type="title"/>
-          </p:nvPr>
-        </p:nvSpPr>
-        <p:spPr/>
-        <p:txBody>
-          <a:bodyPr/>
-          <a:lstStyle/>
-          <a:p>
-            <a:r>
-              <a:rPr lang="en-US" dirty="0" smtClean="0"/>
-              <a:t>Data Access in MVC Application</a:t>
-            </a:r>
-            <a:endParaRPr lang="en-US" dirty="0"/>
-          </a:p>
-        </p:txBody>
-      </p:sp>
-      <p:sp>
-        <p:nvSpPr>
-          <p:cNvPr id="4" name="Content Placeholder 3"/>
-          <p:cNvSpPr>
-            <a:spLocks noGrp="1"/>
-          </p:cNvSpPr>
-          <p:nvPr>
-            <p:ph idx="1"/>
-          </p:nvPr>
-        </p:nvSpPr>
-        <p:spPr/>
-        <p:txBody>
-          <a:bodyPr>
-            <a:normAutofit fontScale="92500" lnSpcReduction="10000"/>
-          </a:bodyPr>
-          <a:lstStyle/>
-          <a:p>
-            <a:r>
-              <a:rPr lang="en-US" dirty="0"/>
-              <a:t>The Controller responds to URL request, gets data from a model and hands it over to the view. The view then renders the data. Model can be entities or business objects.</a:t>
-            </a:r>
-          </a:p>
-          <a:p>
-            <a:endParaRPr lang="en-US" dirty="0"/>
-          </a:p>
-          <a:p>
-            <a:endParaRPr lang="en-US" dirty="0" smtClean="0"/>
-          </a:p>
-          <a:p>
-            <a:endParaRPr lang="en-US" dirty="0"/>
-          </a:p>
-          <a:p>
-            <a:r>
-              <a:rPr lang="en-US" dirty="0"/>
-              <a:t>Retrieving data from a database table </a:t>
-            </a:r>
-            <a:r>
-              <a:rPr lang="en-US" dirty="0" err="1"/>
-              <a:t>tblEmployee</a:t>
-            </a:r>
-            <a:r>
-              <a:rPr lang="en-US" dirty="0"/>
-              <a:t> using </a:t>
-            </a:r>
-            <a:r>
-              <a:rPr lang="en-US" dirty="0" err="1"/>
-              <a:t>entityframework</a:t>
-            </a:r>
-            <a:r>
-              <a:rPr lang="en-US" dirty="0"/>
-              <a:t>. Here business object as our model</a:t>
-            </a:r>
-            <a:r>
-              <a:rPr lang="en-US" dirty="0" smtClean="0"/>
-              <a:t>.</a:t>
-            </a:r>
-            <a:endParaRPr lang="en-US" dirty="0"/>
-          </a:p>
-          <a:p>
-            <a:r>
-              <a:rPr lang="en-US" dirty="0"/>
-              <a:t>Step 1. Install entity framework using </a:t>
-            </a:r>
-            <a:r>
-              <a:rPr lang="en-US" dirty="0" err="1"/>
-              <a:t>nuget</a:t>
-            </a:r>
-            <a:r>
-              <a:rPr lang="en-US" dirty="0"/>
-              <a:t> package manager.</a:t>
-            </a:r>
-          </a:p>
-          <a:p>
-            <a:r>
-              <a:rPr lang="en-US" dirty="0"/>
-              <a:t>Step 2. Add </a:t>
-            </a:r>
-            <a:r>
-              <a:rPr lang="en-US" dirty="0" err="1"/>
-              <a:t>EmployeeContext.cs</a:t>
-            </a:r>
-            <a:r>
-              <a:rPr lang="en-US" dirty="0"/>
-              <a:t> class file to the Model folder.</a:t>
-            </a:r>
-          </a:p>
-          <a:p>
-            <a:r>
-              <a:rPr lang="en-US" dirty="0"/>
-              <a:t>Step 3. Add a connection string, to the </a:t>
-            </a:r>
-            <a:r>
-              <a:rPr lang="en-US" dirty="0" err="1"/>
-              <a:t>web.config</a:t>
-            </a:r>
-            <a:r>
-              <a:rPr lang="en-US" dirty="0"/>
-              <a:t> file, in the root directory</a:t>
-            </a:r>
-          </a:p>
-          <a:p>
-            <a:endParaRPr lang="en-US" dirty="0"/>
-          </a:p>
-        </p:txBody>
-      </p:sp>
-      <p:pic>
-        <p:nvPicPr>
-          <p:cNvPr id="1027" name="Picture 3"/>
-          <p:cNvPicPr>
-            <a:picLocks noChangeAspect="1" noChangeArrowheads="1"/>
-          </p:cNvPicPr>
-          <p:nvPr/>
-        </p:nvPicPr>
-        <p:blipFill>
-          <a:blip r:embed="rId2">
-            <a:extLst>
-              <a:ext uri="{28A0092B-C50C-407E-A947-70E740481C1C}">
-                <a14:useLocalDpi xmlns:a14="http://schemas.microsoft.com/office/drawing/2010/main" val="0"/>
-              </a:ext>
-            </a:extLst>
-          </a:blip>
-          <a:srcRect/>
-          <a:stretch>
-            <a:fillRect/>
-          </a:stretch>
-        </p:blipFill>
-        <p:spPr bwMode="auto">
-          <a:xfrm>
-            <a:off x="914400" y="2743200"/>
-            <a:ext cx="2743200" cy="1143000"/>
-          </a:xfrm>
-          <a:prstGeom prst="rect">
-            <a:avLst/>
-          </a:prstGeom>
-          <a:noFill/>
-          <a:ln>
-            <a:noFill/>
-          </a:ln>
-          <a:extLst>
-            <a:ext uri="{909E8E84-426E-40DD-AFC4-6F175D3DCCD1}">
-              <a14:hiddenFill xmlns:a14="http://schemas.microsoft.com/office/drawing/2010/main">
-                <a:solidFill>
-                  <a:schemeClr val="accent1"/>
-                </a:solidFill>
-              </a14:hiddenFill>
-            </a:ext>
-            <a:ext uri="{91240B29-F687-4F45-9708-019B960494DF}">
-              <a14:hiddenLine xmlns:a14="http://schemas.microsoft.com/office/drawing/2010/main" w="9525">
-                <a:solidFill>
-                  <a:schemeClr val="tx1"/>
-                </a:solidFill>
-                <a:miter lim="800000"/>
-                <a:headEnd/>
-                <a:tailEnd/>
-              </a14:hiddenLine>
-            </a:ext>
-          </a:extLst>
-        </p:spPr>
-      </p:pic>
-    </p:spTree>
-    <p:extLst>
-      <p:ext uri="{BB962C8B-B14F-4D97-AF65-F5344CB8AC3E}">
-        <p14:creationId xmlns:p14="http://schemas.microsoft.com/office/powerpoint/2010/main" val="481427039"/>
-      </p:ext>
-    </p:extLst>
-  </p:cSld>
-  <p:clrMapOvr>
-    <a:masterClrMapping/>
-  </p:clrMapOvr>
-  <p:timing>
-    <p:tnLst>
-      <p:par>
-        <p:cTn id="1" dur="indefinite" restart="never" nodeType="tmRoot"/>
-      </p:par>
-    </p:tnLst>
-  </p:timing>
-</p:sld>
-</file>
-
-<file path=ppt/slides/slide48.xml><?xml version="1.0" encoding="utf-8"?>
-<p:sld xmlns:a="http://schemas.openxmlformats.org/drawingml/2006/main" xmlns:r="http://schemas.openxmlformats.org/officeDocument/2006/relationships" xmlns:p="http://schemas.openxmlformats.org/presentationml/2006/main">
-  <p:cSld>
-    <p:spTree>
-      <p:nvGrpSpPr>
-        <p:cNvPr id="1" name=""/>
-        <p:cNvGrpSpPr/>
-        <p:nvPr/>
-      </p:nvGrpSpPr>
-      <p:grpSpPr>
-        <a:xfrm>
-          <a:off x="0" y="0"/>
-          <a:ext cx="0" cy="0"/>
-          <a:chOff x="0" y="0"/>
-          <a:chExt cx="0" cy="0"/>
-        </a:xfrm>
-      </p:grpSpPr>
-      <p:sp>
-        <p:nvSpPr>
-          <p:cNvPr id="2" name="Title 1"/>
-          <p:cNvSpPr>
-            <a:spLocks noGrp="1"/>
-          </p:cNvSpPr>
-          <p:nvPr>
-            <p:ph type="title"/>
-          </p:nvPr>
-        </p:nvSpPr>
-        <p:spPr/>
-        <p:txBody>
-          <a:bodyPr/>
-          <a:lstStyle/>
-          <a:p>
-            <a:endParaRPr lang="en-US"/>
-          </a:p>
-        </p:txBody>
-      </p:sp>
-      <p:sp>
-        <p:nvSpPr>
-          <p:cNvPr id="3" name="Content Placeholder 2"/>
-          <p:cNvSpPr>
-            <a:spLocks noGrp="1"/>
-          </p:cNvSpPr>
-          <p:nvPr>
-            <p:ph idx="1"/>
-          </p:nvPr>
-        </p:nvSpPr>
-        <p:spPr/>
-        <p:txBody>
-          <a:bodyPr>
-            <a:normAutofit fontScale="92500" lnSpcReduction="10000"/>
-          </a:bodyPr>
-          <a:lstStyle/>
-          <a:p>
-            <a:r>
-              <a:rPr lang="en-US" dirty="0"/>
-              <a:t>Step 4:  Map "Employee" model class to the database table, </a:t>
-            </a:r>
-            <a:r>
-              <a:rPr lang="en-US" dirty="0" err="1"/>
-              <a:t>tblEmployee</a:t>
-            </a:r>
-            <a:r>
-              <a:rPr lang="en-US" dirty="0"/>
-              <a:t> using "Table" attribute</a:t>
-            </a:r>
-            <a:r>
-              <a:rPr lang="en-US" dirty="0" smtClean="0"/>
-              <a:t>.</a:t>
-            </a:r>
-            <a:endParaRPr lang="en-US" dirty="0"/>
-          </a:p>
-          <a:p>
-            <a:r>
-              <a:rPr lang="en-US" dirty="0"/>
-              <a:t>Step 5 : Make the required changes to "Index()" action method in "Home Controller"</a:t>
-            </a:r>
-          </a:p>
-          <a:p>
-            <a:endParaRPr lang="en-US" dirty="0"/>
-          </a:p>
-          <a:p>
-            <a:endParaRPr lang="en-US" dirty="0" smtClean="0"/>
-          </a:p>
-          <a:p>
-            <a:endParaRPr lang="en-US" dirty="0"/>
-          </a:p>
-          <a:p>
-            <a:endParaRPr lang="en-US" dirty="0" smtClean="0"/>
-          </a:p>
-          <a:p>
-            <a:endParaRPr lang="en-US" dirty="0"/>
-          </a:p>
-          <a:p>
-            <a:r>
-              <a:rPr lang="en-US" dirty="0"/>
-              <a:t>Step 6: Add in </a:t>
-            </a:r>
-            <a:r>
-              <a:rPr lang="en-US" dirty="0" err="1"/>
-              <a:t>g</a:t>
-            </a:r>
-            <a:r>
-              <a:rPr lang="en-US" dirty="0" err="1" smtClean="0"/>
-              <a:t>lobal.asax</a:t>
-            </a:r>
-            <a:r>
-              <a:rPr lang="en-US" dirty="0" smtClean="0"/>
-              <a:t> </a:t>
-            </a:r>
-            <a:r>
-              <a:rPr lang="en-US" dirty="0"/>
-              <a:t>in </a:t>
-            </a:r>
-            <a:r>
-              <a:rPr lang="en-US" dirty="0" err="1"/>
-              <a:t>Application_Start</a:t>
-            </a:r>
-            <a:r>
-              <a:rPr lang="en-US" dirty="0" smtClean="0"/>
-              <a:t>()</a:t>
-            </a:r>
-            <a:endParaRPr lang="en-US" dirty="0"/>
-          </a:p>
-          <a:p>
-            <a:r>
-              <a:rPr lang="en-US" dirty="0" err="1"/>
-              <a:t>Database.SetInitializer</a:t>
-            </a:r>
-            <a:r>
-              <a:rPr lang="en-US" dirty="0"/>
-              <a:t>&lt;</a:t>
-            </a:r>
-            <a:r>
-              <a:rPr lang="en-US" dirty="0" err="1"/>
-              <a:t>MVCModel.Models.EmployeeContext</a:t>
-            </a:r>
-            <a:r>
-              <a:rPr lang="en-US" dirty="0"/>
-              <a:t>&gt;(null);</a:t>
-            </a:r>
-          </a:p>
-        </p:txBody>
-      </p:sp>
-      <p:pic>
-        <p:nvPicPr>
-          <p:cNvPr id="2050" name="Picture 2"/>
-          <p:cNvPicPr>
-            <a:picLocks noChangeAspect="1" noChangeArrowheads="1"/>
-          </p:cNvPicPr>
-          <p:nvPr/>
-        </p:nvPicPr>
-        <p:blipFill>
-          <a:blip r:embed="rId2">
-            <a:extLst>
-              <a:ext uri="{28A0092B-C50C-407E-A947-70E740481C1C}">
-                <a14:useLocalDpi xmlns:a14="http://schemas.microsoft.com/office/drawing/2010/main" val="0"/>
-              </a:ext>
-            </a:extLst>
-          </a:blip>
-          <a:srcRect/>
-          <a:stretch>
-            <a:fillRect/>
-          </a:stretch>
-        </p:blipFill>
-        <p:spPr bwMode="auto">
-          <a:xfrm>
-            <a:off x="914400" y="3435458"/>
-            <a:ext cx="6381835" cy="1288942"/>
-          </a:xfrm>
-          <a:prstGeom prst="rect">
-            <a:avLst/>
-          </a:prstGeom>
-          <a:noFill/>
-          <a:ln>
-            <a:noFill/>
-          </a:ln>
-          <a:extLst>
-            <a:ext uri="{909E8E84-426E-40DD-AFC4-6F175D3DCCD1}">
-              <a14:hiddenFill xmlns:a14="http://schemas.microsoft.com/office/drawing/2010/main">
-                <a:solidFill>
-                  <a:schemeClr val="accent1"/>
-                </a:solidFill>
-              </a14:hiddenFill>
-            </a:ext>
-            <a:ext uri="{91240B29-F687-4F45-9708-019B960494DF}">
-              <a14:hiddenLine xmlns:a14="http://schemas.microsoft.com/office/drawing/2010/main" w="9525">
-                <a:solidFill>
-                  <a:schemeClr val="tx1"/>
-                </a:solidFill>
-                <a:miter lim="800000"/>
-                <a:headEnd/>
-                <a:tailEnd/>
-              </a14:hiddenLine>
-            </a:ext>
-          </a:extLst>
-        </p:spPr>
-      </p:pic>
-    </p:spTree>
-    <p:extLst>
-      <p:ext uri="{BB962C8B-B14F-4D97-AF65-F5344CB8AC3E}">
-        <p14:creationId xmlns:p14="http://schemas.microsoft.com/office/powerpoint/2010/main" val="273800358"/>
-      </p:ext>
-    </p:extLst>
-  </p:cSld>
-  <p:clrMapOvr>
-    <a:masterClrMapping/>
-  </p:clrMapOvr>
-  <p:timing>
-    <p:tnLst>
-      <p:par>
-        <p:cTn id="1" dur="indefinite" restart="never" nodeType="tmRoot"/>
-      </p:par>
-    </p:tnLst>
-  </p:timing>
-</p:sld>
-</file>
-
-<file path=ppt/slides/slide49.xml><?xml version="1.0" encoding="utf-8"?>
-<p:sld xmlns:a="http://schemas.openxmlformats.org/drawingml/2006/main" xmlns:r="http://schemas.openxmlformats.org/officeDocument/2006/relationships" xmlns:p="http://schemas.openxmlformats.org/presentationml/2006/main">
-  <p:cSld>
-    <p:spTree>
-      <p:nvGrpSpPr>
-        <p:cNvPr id="1" name=""/>
-        <p:cNvGrpSpPr/>
-        <p:nvPr/>
-      </p:nvGrpSpPr>
-      <p:grpSpPr>
-        <a:xfrm>
-          <a:off x="0" y="0"/>
-          <a:ext cx="0" cy="0"/>
-          <a:chOff x="0" y="0"/>
-          <a:chExt cx="0" cy="0"/>
-        </a:xfrm>
-      </p:grpSpPr>
-      <p:sp>
-        <p:nvSpPr>
-          <p:cNvPr id="2" name="Title 1"/>
-          <p:cNvSpPr>
-            <a:spLocks noGrp="1"/>
-          </p:cNvSpPr>
-          <p:nvPr>
-            <p:ph type="title"/>
-          </p:nvPr>
-        </p:nvSpPr>
-        <p:spPr/>
-        <p:txBody>
-          <a:bodyPr/>
-          <a:lstStyle/>
-          <a:p>
-            <a:r>
-              <a:rPr lang="en-US" dirty="0" smtClean="0"/>
-              <a:t>Generating Hyperlinks </a:t>
-            </a:r>
-            <a:endParaRPr lang="en-US" dirty="0"/>
-          </a:p>
-        </p:txBody>
-      </p:sp>
-      <p:pic>
-        <p:nvPicPr>
-          <p:cNvPr id="3074" name="Picture 2"/>
-          <p:cNvPicPr>
-            <a:picLocks noChangeAspect="1" noChangeArrowheads="1"/>
-          </p:cNvPicPr>
-          <p:nvPr/>
-        </p:nvPicPr>
-        <p:blipFill>
-          <a:blip r:embed="rId2">
-            <a:extLst>
-              <a:ext uri="{28A0092B-C50C-407E-A947-70E740481C1C}">
-                <a14:useLocalDpi xmlns:a14="http://schemas.microsoft.com/office/drawing/2010/main" val="0"/>
-              </a:ext>
-            </a:extLst>
-          </a:blip>
-          <a:srcRect/>
-          <a:stretch>
-            <a:fillRect/>
-          </a:stretch>
-        </p:blipFill>
-        <p:spPr bwMode="auto">
-          <a:xfrm>
-            <a:off x="152400" y="1600200"/>
-            <a:ext cx="8070317" cy="5029200"/>
-          </a:xfrm>
-          <a:prstGeom prst="rect">
-            <a:avLst/>
-          </a:prstGeom>
-          <a:noFill/>
-          <a:ln>
-            <a:noFill/>
-          </a:ln>
-          <a:extLst>
-            <a:ext uri="{909E8E84-426E-40DD-AFC4-6F175D3DCCD1}">
-              <a14:hiddenFill xmlns:a14="http://schemas.microsoft.com/office/drawing/2010/main">
-                <a:solidFill>
-                  <a:schemeClr val="accent1"/>
-                </a:solidFill>
-              </a14:hiddenFill>
-            </a:ext>
-            <a:ext uri="{91240B29-F687-4F45-9708-019B960494DF}">
-              <a14:hiddenLine xmlns:a14="http://schemas.microsoft.com/office/drawing/2010/main" w="9525">
-                <a:solidFill>
-                  <a:schemeClr val="tx1"/>
-                </a:solidFill>
-                <a:miter lim="800000"/>
-                <a:headEnd/>
-                <a:tailEnd/>
-              </a14:hiddenLine>
-            </a:ext>
-          </a:extLst>
-        </p:spPr>
-      </p:pic>
-    </p:spTree>
-    <p:extLst>
-      <p:ext uri="{BB962C8B-B14F-4D97-AF65-F5344CB8AC3E}">
-        <p14:creationId xmlns:p14="http://schemas.microsoft.com/office/powerpoint/2010/main" val="2185156861"/>
       </p:ext>
     </p:extLst>
   </p:cSld>
@@ -28278,431 +26984,6 @@
       </p:par>
     </p:tnLst>
   </p:timing>
-</p:sld>
-</file>
-
-<file path=ppt/slides/slide50.xml><?xml version="1.0" encoding="utf-8"?>
-<p:sld xmlns:a="http://schemas.openxmlformats.org/drawingml/2006/main" xmlns:r="http://schemas.openxmlformats.org/officeDocument/2006/relationships" xmlns:p="http://schemas.openxmlformats.org/presentationml/2006/main">
-  <p:cSld>
-    <p:spTree>
-      <p:nvGrpSpPr>
-        <p:cNvPr id="1" name=""/>
-        <p:cNvGrpSpPr/>
-        <p:nvPr/>
-      </p:nvGrpSpPr>
-      <p:grpSpPr>
-        <a:xfrm>
-          <a:off x="0" y="0"/>
-          <a:ext cx="0" cy="0"/>
-          <a:chOff x="0" y="0"/>
-          <a:chExt cx="0" cy="0"/>
-        </a:xfrm>
-      </p:grpSpPr>
-      <p:sp>
-        <p:nvSpPr>
-          <p:cNvPr id="2" name="Title 1"/>
-          <p:cNvSpPr>
-            <a:spLocks noGrp="1"/>
-          </p:cNvSpPr>
-          <p:nvPr>
-            <p:ph type="title"/>
-          </p:nvPr>
-        </p:nvSpPr>
-        <p:spPr/>
-        <p:txBody>
-          <a:bodyPr/>
-          <a:lstStyle/>
-          <a:p>
-            <a:r>
-              <a:rPr lang="en-US" dirty="0" smtClean="0"/>
-              <a:t>Working with multiple table</a:t>
-            </a:r>
-            <a:endParaRPr lang="en-US" dirty="0"/>
-          </a:p>
-        </p:txBody>
-      </p:sp>
-      <p:pic>
-        <p:nvPicPr>
-          <p:cNvPr id="4098" name="Picture 2"/>
-          <p:cNvPicPr>
-            <a:picLocks noGrp="1" noChangeAspect="1" noChangeArrowheads="1"/>
-          </p:cNvPicPr>
-          <p:nvPr>
-            <p:ph idx="1"/>
-          </p:nvPr>
-        </p:nvPicPr>
-        <p:blipFill>
-          <a:blip r:embed="rId2">
-            <a:extLst>
-              <a:ext uri="{28A0092B-C50C-407E-A947-70E740481C1C}">
-                <a14:useLocalDpi xmlns:a14="http://schemas.microsoft.com/office/drawing/2010/main" val="0"/>
-              </a:ext>
-            </a:extLst>
-          </a:blip>
-          <a:srcRect/>
-          <a:stretch>
-            <a:fillRect/>
-          </a:stretch>
-        </p:blipFill>
-        <p:spPr bwMode="auto">
-          <a:xfrm>
-            <a:off x="304800" y="1447800"/>
-            <a:ext cx="7848600" cy="4953000"/>
-          </a:xfrm>
-          <a:prstGeom prst="rect">
-            <a:avLst/>
-          </a:prstGeom>
-          <a:noFill/>
-          <a:ln>
-            <a:noFill/>
-          </a:ln>
-          <a:extLst>
-            <a:ext uri="{909E8E84-426E-40DD-AFC4-6F175D3DCCD1}">
-              <a14:hiddenFill xmlns:a14="http://schemas.microsoft.com/office/drawing/2010/main">
-                <a:solidFill>
-                  <a:schemeClr val="accent1"/>
-                </a:solidFill>
-              </a14:hiddenFill>
-            </a:ext>
-            <a:ext uri="{91240B29-F687-4F45-9708-019B960494DF}">
-              <a14:hiddenLine xmlns:a14="http://schemas.microsoft.com/office/drawing/2010/main" w="9525">
-                <a:solidFill>
-                  <a:schemeClr val="tx1"/>
-                </a:solidFill>
-                <a:miter lim="800000"/>
-                <a:headEnd/>
-                <a:tailEnd/>
-              </a14:hiddenLine>
-            </a:ext>
-          </a:extLst>
-        </p:spPr>
-      </p:pic>
-    </p:spTree>
-    <p:extLst>
-      <p:ext uri="{BB962C8B-B14F-4D97-AF65-F5344CB8AC3E}">
-        <p14:creationId xmlns:p14="http://schemas.microsoft.com/office/powerpoint/2010/main" val="4174143718"/>
-      </p:ext>
-    </p:extLst>
-  </p:cSld>
-  <p:clrMapOvr>
-    <a:masterClrMapping/>
-  </p:clrMapOvr>
-  <p:timing>
-    <p:tnLst>
-      <p:par>
-        <p:cTn id="1" dur="indefinite" restart="never" nodeType="tmRoot"/>
-      </p:par>
-    </p:tnLst>
-  </p:timing>
-</p:sld>
-</file>
-
-<file path=ppt/slides/slide51.xml><?xml version="1.0" encoding="utf-8"?>
-<p:sld xmlns:a="http://schemas.openxmlformats.org/drawingml/2006/main" xmlns:r="http://schemas.openxmlformats.org/officeDocument/2006/relationships" xmlns:p="http://schemas.openxmlformats.org/presentationml/2006/main">
-  <p:cSld>
-    <p:spTree>
-      <p:nvGrpSpPr>
-        <p:cNvPr id="1" name=""/>
-        <p:cNvGrpSpPr/>
-        <p:nvPr/>
-      </p:nvGrpSpPr>
-      <p:grpSpPr>
-        <a:xfrm>
-          <a:off x="0" y="0"/>
-          <a:ext cx="0" cy="0"/>
-          <a:chOff x="0" y="0"/>
-          <a:chExt cx="0" cy="0"/>
-        </a:xfrm>
-      </p:grpSpPr>
-      <p:sp>
-        <p:nvSpPr>
-          <p:cNvPr id="2" name="Title 1"/>
-          <p:cNvSpPr>
-            <a:spLocks noGrp="1"/>
-          </p:cNvSpPr>
-          <p:nvPr>
-            <p:ph type="title"/>
-          </p:nvPr>
-        </p:nvSpPr>
-        <p:spPr/>
-        <p:txBody>
-          <a:bodyPr/>
-          <a:lstStyle/>
-          <a:p>
-            <a:r>
-              <a:rPr lang="en-US" dirty="0" smtClean="0"/>
-              <a:t>Question</a:t>
-            </a:r>
-            <a:endParaRPr lang="en-US" dirty="0"/>
-          </a:p>
-        </p:txBody>
-      </p:sp>
-      <p:sp>
-        <p:nvSpPr>
-          <p:cNvPr id="3" name="Content Placeholder 2"/>
-          <p:cNvSpPr>
-            <a:spLocks noGrp="1"/>
-          </p:cNvSpPr>
-          <p:nvPr>
-            <p:ph idx="1"/>
-          </p:nvPr>
-        </p:nvSpPr>
-        <p:spPr/>
-        <p:txBody>
-          <a:bodyPr/>
-          <a:lstStyle/>
-          <a:p>
-            <a:pPr marL="114300" indent="0">
-              <a:buNone/>
-            </a:pPr>
-            <a:endParaRPr lang="en-US" dirty="0"/>
-          </a:p>
-        </p:txBody>
-      </p:sp>
-    </p:spTree>
-    <p:extLst>
-      <p:ext uri="{BB962C8B-B14F-4D97-AF65-F5344CB8AC3E}">
-        <p14:creationId xmlns:p14="http://schemas.microsoft.com/office/powerpoint/2010/main" val="3121391149"/>
-      </p:ext>
-    </p:extLst>
-  </p:cSld>
-  <p:clrMapOvr>
-    <a:masterClrMapping/>
-  </p:clrMapOvr>
-  <p:timing>
-    <p:tnLst>
-      <p:par>
-        <p:cTn id="1" dur="indefinite" restart="never" nodeType="tmRoot"/>
-      </p:par>
-    </p:tnLst>
-  </p:timing>
-</p:sld>
-</file>
-
-<file path=ppt/slides/slide52.xml><?xml version="1.0" encoding="utf-8"?>
-<p:sld xmlns:a="http://schemas.openxmlformats.org/drawingml/2006/main" xmlns:r="http://schemas.openxmlformats.org/officeDocument/2006/relationships" xmlns:p="http://schemas.openxmlformats.org/presentationml/2006/main">
-  <p:cSld>
-    <p:spTree>
-      <p:nvGrpSpPr>
-        <p:cNvPr id="1" name=""/>
-        <p:cNvGrpSpPr/>
-        <p:nvPr/>
-      </p:nvGrpSpPr>
-      <p:grpSpPr>
-        <a:xfrm>
-          <a:off x="0" y="0"/>
-          <a:ext cx="0" cy="0"/>
-          <a:chOff x="0" y="0"/>
-          <a:chExt cx="0" cy="0"/>
-        </a:xfrm>
-      </p:grpSpPr>
-      <p:sp>
-        <p:nvSpPr>
-          <p:cNvPr id="2" name="Title 1"/>
-          <p:cNvSpPr>
-            <a:spLocks noGrp="1"/>
-          </p:cNvSpPr>
-          <p:nvPr>
-            <p:ph type="title"/>
-          </p:nvPr>
-        </p:nvSpPr>
-        <p:spPr/>
-        <p:txBody>
-          <a:bodyPr>
-            <a:normAutofit fontScale="90000"/>
-          </a:bodyPr>
-          <a:lstStyle/>
-          <a:p>
-            <a:r>
-              <a:rPr lang="en-US" dirty="0"/>
-              <a:t>How do I live without </a:t>
-            </a:r>
-            <a:r>
-              <a:rPr lang="en-US" dirty="0" err="1"/>
-              <a:t>ViewState</a:t>
-            </a:r>
-            <a:r>
-              <a:rPr lang="en-US" dirty="0"/>
-              <a:t> in MVC</a:t>
-            </a:r>
-            <a:r>
-              <a:rPr lang="en-US" dirty="0" smtClean="0"/>
-              <a:t>?</a:t>
-            </a:r>
-            <a:endParaRPr lang="en-US" dirty="0"/>
-          </a:p>
-        </p:txBody>
-      </p:sp>
-      <p:sp>
-        <p:nvSpPr>
-          <p:cNvPr id="3" name="Content Placeholder 2"/>
-          <p:cNvSpPr>
-            <a:spLocks noGrp="1"/>
-          </p:cNvSpPr>
-          <p:nvPr>
-            <p:ph idx="1"/>
-          </p:nvPr>
-        </p:nvSpPr>
-        <p:spPr/>
-        <p:txBody>
-          <a:bodyPr>
-            <a:normAutofit/>
-          </a:bodyPr>
-          <a:lstStyle/>
-          <a:p>
-            <a:r>
-              <a:rPr lang="en-US" dirty="0"/>
-              <a:t>We know, web is stateless. Web Controls are gone in MVC. There are no events firing on the server side. This is replaced by two different mechanisms--URLs and </a:t>
-            </a:r>
-            <a:r>
-              <a:rPr lang="en-US" dirty="0" err="1"/>
-              <a:t>POSTing</a:t>
-            </a:r>
-            <a:r>
-              <a:rPr lang="en-US" dirty="0"/>
-              <a:t> form data. Proper use of these will replace your need for the </a:t>
-            </a:r>
-            <a:r>
-              <a:rPr lang="en-US" dirty="0" err="1"/>
-              <a:t>ViewState</a:t>
-            </a:r>
-            <a:r>
-              <a:rPr lang="en-US" dirty="0"/>
-              <a:t>.</a:t>
-            </a:r>
-          </a:p>
-          <a:p>
-            <a:endParaRPr lang="en-US" dirty="0"/>
-          </a:p>
-          <a:p>
-            <a:r>
-              <a:rPr lang="en-US" dirty="0"/>
-              <a:t>Suppose In a conventional ASP.NET web application, you would place a </a:t>
-            </a:r>
-            <a:r>
-              <a:rPr lang="en-US" dirty="0" err="1"/>
-              <a:t>LinkButton</a:t>
-            </a:r>
-            <a:r>
-              <a:rPr lang="en-US" dirty="0"/>
-              <a:t> on your webpage that would perform function X. ASP.NET would stick lots of </a:t>
-            </a:r>
-            <a:r>
-              <a:rPr lang="en-US" dirty="0" err="1"/>
-              <a:t>ViewState</a:t>
-            </a:r>
-            <a:r>
-              <a:rPr lang="en-US" dirty="0"/>
-              <a:t>. when the user clicks on the button and "posts back" to the website (by submitting a form nobody knows existed), ASP.NET reconstructs what happened and determines a particular button event handler must be executed.  </a:t>
-            </a:r>
-          </a:p>
-          <a:p>
-            <a:endParaRPr lang="en-US" dirty="0"/>
-          </a:p>
-          <a:p>
-            <a:endParaRPr lang="en-US" dirty="0"/>
-          </a:p>
-        </p:txBody>
-      </p:sp>
-    </p:spTree>
-    <p:extLst>
-      <p:ext uri="{BB962C8B-B14F-4D97-AF65-F5344CB8AC3E}">
-        <p14:creationId xmlns:p14="http://schemas.microsoft.com/office/powerpoint/2010/main" val="2020425772"/>
-      </p:ext>
-    </p:extLst>
-  </p:cSld>
-  <p:clrMapOvr>
-    <a:masterClrMapping/>
-  </p:clrMapOvr>
-  <p:timing>
-    <p:tnLst>
-      <p:par>
-        <p:cTn id="1" dur="indefinite" restart="never" nodeType="tmRoot"/>
-      </p:par>
-    </p:tnLst>
-  </p:timing>
-</p:sld>
-</file>
-
-<file path=ppt/slides/slide53.xml><?xml version="1.0" encoding="utf-8"?>
-<p:sld xmlns:a="http://schemas.openxmlformats.org/drawingml/2006/main" xmlns:r="http://schemas.openxmlformats.org/officeDocument/2006/relationships" xmlns:p="http://schemas.openxmlformats.org/presentationml/2006/main">
-  <p:cSld>
-    <p:spTree>
-      <p:nvGrpSpPr>
-        <p:cNvPr id="1" name=""/>
-        <p:cNvGrpSpPr/>
-        <p:nvPr/>
-      </p:nvGrpSpPr>
-      <p:grpSpPr>
-        <a:xfrm>
-          <a:off x="0" y="0"/>
-          <a:ext cx="0" cy="0"/>
-          <a:chOff x="0" y="0"/>
-          <a:chExt cx="0" cy="0"/>
-        </a:xfrm>
-      </p:grpSpPr>
-      <p:sp>
-        <p:nvSpPr>
-          <p:cNvPr id="2" name="Title 1"/>
-          <p:cNvSpPr>
-            <a:spLocks noGrp="1"/>
-          </p:cNvSpPr>
-          <p:nvPr>
-            <p:ph type="title"/>
-          </p:nvPr>
-        </p:nvSpPr>
-        <p:spPr/>
-        <p:txBody>
-          <a:bodyPr/>
-          <a:lstStyle/>
-          <a:p>
-            <a:endParaRPr lang="en-US"/>
-          </a:p>
-        </p:txBody>
-      </p:sp>
-      <p:sp>
-        <p:nvSpPr>
-          <p:cNvPr id="3" name="Content Placeholder 2"/>
-          <p:cNvSpPr>
-            <a:spLocks noGrp="1"/>
-          </p:cNvSpPr>
-          <p:nvPr>
-            <p:ph idx="1"/>
-          </p:nvPr>
-        </p:nvSpPr>
-        <p:spPr/>
-        <p:txBody>
-          <a:bodyPr>
-            <a:normAutofit/>
-          </a:bodyPr>
-          <a:lstStyle/>
-          <a:p>
-            <a:r>
-              <a:rPr lang="en-US" dirty="0"/>
-              <a:t>In MVC, you construct your link to access a particular route. The route describes what the user wishes to do--/Users/Delinquent/Index.  The routing system in MVC determines which Controller will handle this route and which method on that controller will execute. Any additional information can be transmitted to the controller method by URL query string values.</a:t>
-            </a:r>
-          </a:p>
-          <a:p>
-            <a:endParaRPr lang="en-US" dirty="0"/>
-          </a:p>
-          <a:p>
-            <a:r>
-              <a:rPr lang="en-US" dirty="0"/>
-              <a:t>So you "maintain" state via query strings and form POST values. You'll find that, in fact, there isn't that much state to maintain in the end. In fact, having to maintain lots of state is a good indication that your design is lacking or that you're trying to do something that doesn't fit a website model.</a:t>
-            </a:r>
-          </a:p>
-        </p:txBody>
-      </p:sp>
-    </p:spTree>
-    <p:extLst>
-      <p:ext uri="{BB962C8B-B14F-4D97-AF65-F5344CB8AC3E}">
-        <p14:creationId xmlns:p14="http://schemas.microsoft.com/office/powerpoint/2010/main" val="3585781993"/>
-      </p:ext>
-    </p:extLst>
-  </p:cSld>
-  <p:clrMapOvr>
-    <a:masterClrMapping/>
-  </p:clrMapOvr>
 </p:sld>
 </file>
 

</xml_diff>